<commit_message>
Update project05 - 파워포인트 종합 - 기범.pptx
</commit_message>
<xml_diff>
--- a/0 발표용 파워포인트/project05 - 파워포인트 종합 - 기범.pptx
+++ b/0 발표용 파워포인트/project05 - 파워포인트 종합 - 기범.pptx
@@ -125,7 +125,7 @@
   </p:defaultTextStyle>
   <p:extLst>
     <p:ext uri="{EFAFB233-063F-42B5-8137-9DF3F51BA10A}">
-      <p15:sldGuideLst xmlns:p15="http://schemas.microsoft.com/office/powerpoint/2012/main">
+      <p15:sldGuideLst xmlns:p15="http://schemas.microsoft.com/office/powerpoint/2012/main" xmlns="">
         <p15:guide id="1" orient="horz" pos="2160">
           <p15:clr>
             <a:srgbClr val="A4A3A4"/>
@@ -5866,15 +5866,7 @@
                             <a:schemeClr val="dk1"/>
                           </a:solidFill>
                         </a:rPr>
-                        <a:t> 후기 목</a:t>
-                      </a:r>
-                      <a:r>
-                        <a:rPr lang="ko-KR" altLang="en-US" sz="1500" b="0" u="none" strike="noStrike" cap="none" smtClean="0">
-                          <a:solidFill>
-                            <a:schemeClr val="dk1"/>
-                          </a:solidFill>
-                        </a:rPr>
-                        <a:t>록</a:t>
+                        <a:t> 후기 목록</a:t>
                       </a:r>
                       <a:endParaRPr sz="1500" b="0" u="none" strike="noStrike" cap="none" dirty="0">
                         <a:solidFill>
@@ -12936,14 +12928,14 @@
                 <a:gridCol w="1443550">
                   <a:extLst>
                     <a:ext uri="{9D8B030D-6E8A-4147-A177-3AD203B41FA5}">
-                      <a16:colId xmlns="" xmlns:a16="http://schemas.microsoft.com/office/drawing/2014/main" val="20000"/>
+                      <a16:colId xmlns:a16="http://schemas.microsoft.com/office/drawing/2014/main" xmlns="" val="20000"/>
                     </a:ext>
                   </a:extLst>
                 </a:gridCol>
                 <a:gridCol w="2680550">
                   <a:extLst>
                     <a:ext uri="{9D8B030D-6E8A-4147-A177-3AD203B41FA5}">
-                      <a16:colId xmlns="" xmlns:a16="http://schemas.microsoft.com/office/drawing/2014/main" val="20001"/>
+                      <a16:colId xmlns:a16="http://schemas.microsoft.com/office/drawing/2014/main" xmlns="" val="20001"/>
                     </a:ext>
                   </a:extLst>
                 </a:gridCol>
@@ -13101,7 +13093,7 @@
                 </a:tc>
                 <a:extLst>
                   <a:ext uri="{0D108BD9-81ED-4DB2-BD59-A6C34878D82A}">
-                    <a16:rowId xmlns="" xmlns:a16="http://schemas.microsoft.com/office/drawing/2014/main" val="10000"/>
+                    <a16:rowId xmlns:a16="http://schemas.microsoft.com/office/drawing/2014/main" xmlns="" val="10000"/>
                   </a:ext>
                 </a:extLst>
               </a:tr>
@@ -13269,7 +13261,7 @@
                 </a:tc>
                 <a:extLst>
                   <a:ext uri="{0D108BD9-81ED-4DB2-BD59-A6C34878D82A}">
-                    <a16:rowId xmlns="" xmlns:a16="http://schemas.microsoft.com/office/drawing/2014/main" val="10001"/>
+                    <a16:rowId xmlns:a16="http://schemas.microsoft.com/office/drawing/2014/main" xmlns="" val="10001"/>
                   </a:ext>
                 </a:extLst>
               </a:tr>
@@ -13357,7 +13349,7 @@
                 </a:tc>
                 <a:extLst>
                   <a:ext uri="{0D108BD9-81ED-4DB2-BD59-A6C34878D82A}">
-                    <a16:rowId xmlns="" xmlns:a16="http://schemas.microsoft.com/office/drawing/2014/main" val="10002"/>
+                    <a16:rowId xmlns:a16="http://schemas.microsoft.com/office/drawing/2014/main" xmlns="" val="10002"/>
                   </a:ext>
                 </a:extLst>
               </a:tr>
@@ -13385,14 +13377,14 @@
                 <a:gridCol w="1407750">
                   <a:extLst>
                     <a:ext uri="{9D8B030D-6E8A-4147-A177-3AD203B41FA5}">
-                      <a16:colId xmlns="" xmlns:a16="http://schemas.microsoft.com/office/drawing/2014/main" val="20000"/>
+                      <a16:colId xmlns:a16="http://schemas.microsoft.com/office/drawing/2014/main" xmlns="" val="20000"/>
                     </a:ext>
                   </a:extLst>
                 </a:gridCol>
                 <a:gridCol w="1407750">
                   <a:extLst>
                     <a:ext uri="{9D8B030D-6E8A-4147-A177-3AD203B41FA5}">
-                      <a16:colId xmlns="" xmlns:a16="http://schemas.microsoft.com/office/drawing/2014/main" val="20001"/>
+                      <a16:colId xmlns:a16="http://schemas.microsoft.com/office/drawing/2014/main" xmlns="" val="20001"/>
                     </a:ext>
                   </a:extLst>
                 </a:gridCol>
@@ -13550,7 +13542,7 @@
                 </a:tc>
                 <a:extLst>
                   <a:ext uri="{0D108BD9-81ED-4DB2-BD59-A6C34878D82A}">
-                    <a16:rowId xmlns="" xmlns:a16="http://schemas.microsoft.com/office/drawing/2014/main" val="10000"/>
+                    <a16:rowId xmlns:a16="http://schemas.microsoft.com/office/drawing/2014/main" xmlns="" val="10000"/>
                   </a:ext>
                 </a:extLst>
               </a:tr>
@@ -13578,14 +13570,14 @@
                 <a:gridCol w="1407750">
                   <a:extLst>
                     <a:ext uri="{9D8B030D-6E8A-4147-A177-3AD203B41FA5}">
-                      <a16:colId xmlns="" xmlns:a16="http://schemas.microsoft.com/office/drawing/2014/main" val="20000"/>
+                      <a16:colId xmlns:a16="http://schemas.microsoft.com/office/drawing/2014/main" xmlns="" val="20000"/>
                     </a:ext>
                   </a:extLst>
                 </a:gridCol>
                 <a:gridCol w="1407750">
                   <a:extLst>
                     <a:ext uri="{9D8B030D-6E8A-4147-A177-3AD203B41FA5}">
-                      <a16:colId xmlns="" xmlns:a16="http://schemas.microsoft.com/office/drawing/2014/main" val="20001"/>
+                      <a16:colId xmlns:a16="http://schemas.microsoft.com/office/drawing/2014/main" xmlns="" val="20001"/>
                     </a:ext>
                   </a:extLst>
                 </a:gridCol>
@@ -13743,7 +13735,7 @@
                 </a:tc>
                 <a:extLst>
                   <a:ext uri="{0D108BD9-81ED-4DB2-BD59-A6C34878D82A}">
-                    <a16:rowId xmlns="" xmlns:a16="http://schemas.microsoft.com/office/drawing/2014/main" val="10000"/>
+                    <a16:rowId xmlns:a16="http://schemas.microsoft.com/office/drawing/2014/main" xmlns="" val="10000"/>
                   </a:ext>
                 </a:extLst>
               </a:tr>
@@ -13773,14 +13765,14 @@
                 <a:gridCol w="382900">
                   <a:extLst>
                     <a:ext uri="{9D8B030D-6E8A-4147-A177-3AD203B41FA5}">
-                      <a16:colId xmlns="" xmlns:a16="http://schemas.microsoft.com/office/drawing/2014/main" val="20000"/>
+                      <a16:colId xmlns:a16="http://schemas.microsoft.com/office/drawing/2014/main" xmlns="" val="20000"/>
                     </a:ext>
                   </a:extLst>
                 </a:gridCol>
                 <a:gridCol w="3149100">
                   <a:extLst>
                     <a:ext uri="{9D8B030D-6E8A-4147-A177-3AD203B41FA5}">
-                      <a16:colId xmlns="" xmlns:a16="http://schemas.microsoft.com/office/drawing/2014/main" val="20001"/>
+                      <a16:colId xmlns:a16="http://schemas.microsoft.com/office/drawing/2014/main" xmlns="" val="20001"/>
                     </a:ext>
                   </a:extLst>
                 </a:gridCol>
@@ -13938,7 +13930,7 @@
                 </a:tc>
                 <a:extLst>
                   <a:ext uri="{0D108BD9-81ED-4DB2-BD59-A6C34878D82A}">
-                    <a16:rowId xmlns="" xmlns:a16="http://schemas.microsoft.com/office/drawing/2014/main" val="10000"/>
+                    <a16:rowId xmlns:a16="http://schemas.microsoft.com/office/drawing/2014/main" xmlns="" val="10000"/>
                   </a:ext>
                 </a:extLst>
               </a:tr>
@@ -14086,7 +14078,7 @@
                 </a:tc>
                 <a:extLst>
                   <a:ext uri="{0D108BD9-81ED-4DB2-BD59-A6C34878D82A}">
-                    <a16:rowId xmlns="" xmlns:a16="http://schemas.microsoft.com/office/drawing/2014/main" val="10001"/>
+                    <a16:rowId xmlns:a16="http://schemas.microsoft.com/office/drawing/2014/main" xmlns="" val="10001"/>
                   </a:ext>
                 </a:extLst>
               </a:tr>
@@ -14237,7 +14229,7 @@
                 </a:tc>
                 <a:extLst>
                   <a:ext uri="{0D108BD9-81ED-4DB2-BD59-A6C34878D82A}">
-                    <a16:rowId xmlns="" xmlns:a16="http://schemas.microsoft.com/office/drawing/2014/main" val="10002"/>
+                    <a16:rowId xmlns:a16="http://schemas.microsoft.com/office/drawing/2014/main" xmlns="" val="10002"/>
                   </a:ext>
                 </a:extLst>
               </a:tr>
@@ -14390,7 +14382,7 @@
                 </a:tc>
                 <a:extLst>
                   <a:ext uri="{0D108BD9-81ED-4DB2-BD59-A6C34878D82A}">
-                    <a16:rowId xmlns="" xmlns:a16="http://schemas.microsoft.com/office/drawing/2014/main" val="10003"/>
+                    <a16:rowId xmlns:a16="http://schemas.microsoft.com/office/drawing/2014/main" xmlns="" val="10003"/>
                   </a:ext>
                 </a:extLst>
               </a:tr>
@@ -14542,7 +14534,7 @@
                 </a:tc>
                 <a:extLst>
                   <a:ext uri="{0D108BD9-81ED-4DB2-BD59-A6C34878D82A}">
-                    <a16:rowId xmlns="" xmlns:a16="http://schemas.microsoft.com/office/drawing/2014/main" val="10004"/>
+                    <a16:rowId xmlns:a16="http://schemas.microsoft.com/office/drawing/2014/main" xmlns="" val="10004"/>
                   </a:ext>
                 </a:extLst>
               </a:tr>
@@ -14701,7 +14693,7 @@
                 </a:tc>
                 <a:extLst>
                   <a:ext uri="{0D108BD9-81ED-4DB2-BD59-A6C34878D82A}">
-                    <a16:rowId xmlns="" xmlns:a16="http://schemas.microsoft.com/office/drawing/2014/main" val="10005"/>
+                    <a16:rowId xmlns:a16="http://schemas.microsoft.com/office/drawing/2014/main" xmlns="" val="10005"/>
                   </a:ext>
                 </a:extLst>
               </a:tr>
@@ -14832,7 +14824,7 @@
                 </a:tc>
                 <a:extLst>
                   <a:ext uri="{0D108BD9-81ED-4DB2-BD59-A6C34878D82A}">
-                    <a16:rowId xmlns="" xmlns:a16="http://schemas.microsoft.com/office/drawing/2014/main" val="10006"/>
+                    <a16:rowId xmlns:a16="http://schemas.microsoft.com/office/drawing/2014/main" xmlns="" val="10006"/>
                   </a:ext>
                 </a:extLst>
               </a:tr>
@@ -14973,7 +14965,7 @@
                 </a:tc>
                 <a:extLst>
                   <a:ext uri="{0D108BD9-81ED-4DB2-BD59-A6C34878D82A}">
-                    <a16:rowId xmlns="" xmlns:a16="http://schemas.microsoft.com/office/drawing/2014/main" val="10007"/>
+                    <a16:rowId xmlns:a16="http://schemas.microsoft.com/office/drawing/2014/main" xmlns="" val="10007"/>
                   </a:ext>
                 </a:extLst>
               </a:tr>
@@ -25726,7 +25718,7 @@
               <a:buNone/>
             </a:pPr>
             <a:r>
-              <a:rPr lang="ko-KR" sz="1800" b="1" i="0" u="none" strike="noStrike" cap="none" dirty="0">
+              <a:rPr lang="en-US" altLang="ko-KR" sz="1800" b="1" i="0" u="none" strike="noStrike" cap="none" dirty="0" smtClean="0">
                 <a:solidFill>
                   <a:schemeClr val="dk1"/>
                 </a:solidFill>
@@ -25735,7 +25727,7 @@
                 <a:cs typeface="Malgun Gothic"/>
                 <a:sym typeface="Malgun Gothic"/>
               </a:rPr>
-              <a:t>5</a:t>
+              <a:t>4</a:t>
             </a:r>
             <a:endParaRPr sz="1800" b="1" i="0" u="none" strike="noStrike" cap="none" dirty="0">
               <a:solidFill>
@@ -29726,14 +29718,14 @@
           <p:nvPr>
             <p:extLst>
               <p:ext uri="{D42A27DB-BD31-4B8C-83A1-F6EECF244321}">
-                <p14:modId xmlns:p14="http://schemas.microsoft.com/office/powerpoint/2010/main" val="1983302455"/>
+                <p14:modId xmlns:p14="http://schemas.microsoft.com/office/powerpoint/2010/main" val="1731303048"/>
               </p:ext>
             </p:extLst>
           </p:nvPr>
         </p:nvGraphicFramePr>
         <p:xfrm>
           <a:off x="8509686" y="1289960"/>
-          <a:ext cx="3532000" cy="5200524"/>
+          <a:ext cx="3532000" cy="5047125"/>
         </p:xfrm>
         <a:graphic>
           <a:graphicData uri="http://schemas.openxmlformats.org/drawingml/2006/table">
@@ -30006,7 +29998,7 @@
                       </a:endParaRPr>
                     </a:p>
                     <a:p>
-                      <a:pPr marL="0" marR="0" lvl="0" indent="0" algn="l" rtl="0">
+                      <a:pPr marL="285750" marR="0" lvl="0" indent="-285750" algn="l" rtl="0">
                         <a:lnSpc>
                           <a:spcPct val="100000"/>
                         </a:lnSpc>
@@ -30020,17 +30012,9 @@
                           <a:srgbClr val="000000"/>
                         </a:buClr>
                         <a:buSzPts val="1500"/>
-                        <a:buFont typeface="Arial"/>
-                        <a:buNone/>
+                        <a:buFontTx/>
+                        <a:buChar char="-"/>
                       </a:pPr>
-                      <a:r>
-                        <a:rPr lang="en-US" sz="1500" b="0" u="none" strike="noStrike" cap="none" baseline="0" dirty="0" smtClean="0">
-                          <a:solidFill>
-                            <a:schemeClr val="dk1"/>
-                          </a:solidFill>
-                        </a:rPr>
-                        <a:t>- </a:t>
-                      </a:r>
                       <a:r>
                         <a:rPr lang="ko-KR" altLang="en-US" sz="1500" b="0" u="none" strike="noStrike" cap="none" baseline="0" dirty="0" smtClean="0">
                           <a:solidFill>
@@ -30093,8 +30077,118 @@
                             <a:schemeClr val="dk1"/>
                           </a:solidFill>
                         </a:rPr>
-                        <a:t> 구현</a:t>
+                        <a:t> </a:t>
                       </a:r>
+                      <a:r>
+                        <a:rPr lang="ko-KR" altLang="en-US" sz="1500" b="0" u="none" strike="noStrike" cap="none" baseline="0" dirty="0" smtClean="0">
+                          <a:solidFill>
+                            <a:schemeClr val="dk1"/>
+                          </a:solidFill>
+                        </a:rPr>
+                        <a:t>구현</a:t>
+                      </a:r>
+                      <a:endParaRPr lang="en-US" altLang="ko-KR" sz="1500" b="0" u="none" strike="noStrike" cap="none" baseline="0" dirty="0" smtClean="0">
+                        <a:solidFill>
+                          <a:schemeClr val="dk1"/>
+                        </a:solidFill>
+                      </a:endParaRPr>
+                    </a:p>
+                    <a:p>
+                      <a:pPr marL="0" marR="0" lvl="0" indent="0" algn="l" rtl="0">
+                        <a:lnSpc>
+                          <a:spcPct val="100000"/>
+                        </a:lnSpc>
+                        <a:spcBef>
+                          <a:spcPts val="0"/>
+                        </a:spcBef>
+                        <a:spcAft>
+                          <a:spcPts val="0"/>
+                        </a:spcAft>
+                        <a:buClr>
+                          <a:srgbClr val="000000"/>
+                        </a:buClr>
+                        <a:buSzPts val="1500"/>
+                        <a:buFont typeface="Arial"/>
+                        <a:buNone/>
+                      </a:pPr>
+                      <a:r>
+                        <a:rPr lang="ko-KR" altLang="en-US" sz="1500" u="none" strike="noStrike" cap="none" dirty="0" smtClean="0">
+                          <a:solidFill>
+                            <a:schemeClr val="dk1"/>
+                          </a:solidFill>
+                        </a:rPr>
+                        <a:t>메인 </a:t>
+                      </a:r>
+                      <a:r>
+                        <a:rPr lang="en-US" altLang="ko-KR" sz="1500" u="none" strike="noStrike" cap="none" dirty="0" smtClean="0">
+                          <a:solidFill>
+                            <a:schemeClr val="dk1"/>
+                          </a:solidFill>
+                        </a:rPr>
+                        <a:t>Footer </a:t>
+                      </a:r>
+                      <a:r>
+                        <a:rPr lang="ko-KR" altLang="en-US" sz="1500" u="none" strike="noStrike" cap="none" dirty="0" smtClean="0">
+                          <a:solidFill>
+                            <a:schemeClr val="dk1"/>
+                          </a:solidFill>
+                        </a:rPr>
+                        <a:t>페이지</a:t>
+                      </a:r>
+                    </a:p>
+                    <a:p>
+                      <a:pPr marL="0" marR="0" lvl="0" indent="0" algn="l" rtl="0">
+                        <a:lnSpc>
+                          <a:spcPct val="100000"/>
+                        </a:lnSpc>
+                        <a:spcBef>
+                          <a:spcPts val="0"/>
+                        </a:spcBef>
+                        <a:spcAft>
+                          <a:spcPts val="0"/>
+                        </a:spcAft>
+                        <a:buClr>
+                          <a:srgbClr val="000000"/>
+                        </a:buClr>
+                        <a:buSzPts val="1500"/>
+                        <a:buFont typeface="Arial"/>
+                        <a:buNone/>
+                      </a:pPr>
+                      <a:r>
+                        <a:rPr lang="en-US" altLang="ko-KR" sz="1500" u="none" strike="noStrike" cap="none" dirty="0" smtClean="0">
+                          <a:solidFill>
+                            <a:schemeClr val="dk1"/>
+                          </a:solidFill>
+                        </a:rPr>
+                        <a:t>- </a:t>
+                      </a:r>
+                      <a:r>
+                        <a:rPr lang="ko-KR" altLang="en-US" sz="1500" u="none" strike="noStrike" cap="none" dirty="0" smtClean="0">
+                          <a:solidFill>
+                            <a:schemeClr val="dk1"/>
+                          </a:solidFill>
+                        </a:rPr>
+                        <a:t>회사 정보를 나타냄</a:t>
+                      </a:r>
+                    </a:p>
+                    <a:p>
+                      <a:pPr marL="285750" marR="0" lvl="0" indent="-285750" algn="l" rtl="0">
+                        <a:lnSpc>
+                          <a:spcPct val="100000"/>
+                        </a:lnSpc>
+                        <a:spcBef>
+                          <a:spcPts val="0"/>
+                        </a:spcBef>
+                        <a:spcAft>
+                          <a:spcPts val="0"/>
+                        </a:spcAft>
+                        <a:buClr>
+                          <a:srgbClr val="000000"/>
+                        </a:buClr>
+                        <a:buSzPts val="1500"/>
+                        <a:buFontTx/>
+                        <a:buChar char="-"/>
+                      </a:pPr>
                       <a:endParaRPr sz="1500" b="0" u="none" strike="noStrike" cap="none" dirty="0">
                         <a:solidFill>
                           <a:schemeClr val="dk1"/>
@@ -30593,7 +30687,7 @@
                   </a:tcPr>
                 </a:tc>
               </a:tr>
-              <a:tr h="644050">
+              <a:tr h="562225">
                 <a:tc>
                   <a:txBody>
                     <a:bodyPr/>
@@ -30641,7 +30735,7 @@
                       <a:headEnd type="none" w="sm" len="sm"/>
                       <a:tailEnd type="none" w="sm" len="sm"/>
                     </a:lnL>
-                    <a:lnR w="12700" cap="flat" cmpd="sng">
+                    <a:lnR w="12700" cap="flat" cmpd="sng" algn="ctr">
                       <a:solidFill>
                         <a:schemeClr val="dk1"/>
                       </a:solidFill>
@@ -30650,223 +30744,7 @@
                       <a:headEnd type="none" w="sm" len="sm"/>
                       <a:tailEnd type="none" w="sm" len="sm"/>
                     </a:lnR>
-                    <a:lnT w="12700" cap="flat" cmpd="sng">
-                      <a:solidFill>
-                        <a:schemeClr val="dk1"/>
-                      </a:solidFill>
-                      <a:prstDash val="solid"/>
-                      <a:round/>
-                      <a:headEnd type="none" w="sm" len="sm"/>
-                      <a:tailEnd type="none" w="sm" len="sm"/>
-                    </a:lnT>
-                    <a:lnB w="12700" cap="flat" cmpd="sng" algn="ctr">
-                      <a:solidFill>
-                        <a:schemeClr val="dk1"/>
-                      </a:solidFill>
-                      <a:prstDash val="solid"/>
-                      <a:round/>
-                      <a:headEnd type="none" w="sm" len="sm"/>
-                      <a:tailEnd type="none" w="sm" len="sm"/>
-                    </a:lnB>
-                    <a:solidFill>
-                      <a:schemeClr val="lt1"/>
-                    </a:solidFill>
-                  </a:tcPr>
-                </a:tc>
-                <a:tc>
-                  <a:txBody>
-                    <a:bodyPr/>
-                    <a:lstStyle/>
-                    <a:p>
-                      <a:pPr marL="0" marR="0" lvl="0" indent="0" algn="l" rtl="0">
-                        <a:lnSpc>
-                          <a:spcPct val="100000"/>
-                        </a:lnSpc>
-                        <a:spcBef>
-                          <a:spcPts val="0"/>
-                        </a:spcBef>
-                        <a:spcAft>
-                          <a:spcPts val="0"/>
-                        </a:spcAft>
-                        <a:buClr>
-                          <a:srgbClr val="000000"/>
-                        </a:buClr>
-                        <a:buSzPts val="1500"/>
-                        <a:buFont typeface="Arial"/>
-                        <a:buNone/>
-                      </a:pPr>
-                      <a:r>
-                        <a:rPr lang="ko-KR" altLang="en-US" sz="1500" u="none" strike="noStrike" cap="none" dirty="0" smtClean="0">
-                          <a:solidFill>
-                            <a:schemeClr val="dk1"/>
-                          </a:solidFill>
-                        </a:rPr>
-                        <a:t>메인 </a:t>
-                      </a:r>
-                      <a:r>
-                        <a:rPr lang="en-US" altLang="ko-KR" sz="1500" u="none" strike="noStrike" cap="none" dirty="0" smtClean="0">
-                          <a:solidFill>
-                            <a:schemeClr val="dk1"/>
-                          </a:solidFill>
-                        </a:rPr>
-                        <a:t>Footer </a:t>
-                      </a:r>
-                      <a:r>
-                        <a:rPr lang="ko-KR" altLang="en-US" sz="1500" u="none" strike="noStrike" cap="none" dirty="0" smtClean="0">
-                          <a:solidFill>
-                            <a:schemeClr val="dk1"/>
-                          </a:solidFill>
-                        </a:rPr>
-                        <a:t>페이지</a:t>
-                      </a:r>
-                      <a:endParaRPr lang="en-US" altLang="ko-KR" sz="1500" u="none" strike="noStrike" cap="none" dirty="0" smtClean="0">
-                        <a:solidFill>
-                          <a:schemeClr val="dk1"/>
-                        </a:solidFill>
-                      </a:endParaRPr>
-                    </a:p>
-                    <a:p>
-                      <a:pPr marL="0" marR="0" lvl="0" indent="0" algn="l" rtl="0">
-                        <a:lnSpc>
-                          <a:spcPct val="100000"/>
-                        </a:lnSpc>
-                        <a:spcBef>
-                          <a:spcPts val="0"/>
-                        </a:spcBef>
-                        <a:spcAft>
-                          <a:spcPts val="0"/>
-                        </a:spcAft>
-                        <a:buClr>
-                          <a:srgbClr val="000000"/>
-                        </a:buClr>
-                        <a:buSzPts val="1500"/>
-                        <a:buFont typeface="Arial"/>
-                        <a:buNone/>
-                      </a:pPr>
-                      <a:r>
-                        <a:rPr lang="en-US" sz="1500" u="none" strike="noStrike" cap="none" dirty="0" smtClean="0">
-                          <a:solidFill>
-                            <a:schemeClr val="dk1"/>
-                          </a:solidFill>
-                        </a:rPr>
-                        <a:t>- </a:t>
-                      </a:r>
-                      <a:r>
-                        <a:rPr lang="ko-KR" altLang="en-US" sz="1500" u="none" strike="noStrike" cap="none" dirty="0" smtClean="0">
-                          <a:solidFill>
-                            <a:schemeClr val="dk1"/>
-                          </a:solidFill>
-                        </a:rPr>
-                        <a:t>회사 정보를 나타냄</a:t>
-                      </a:r>
-                      <a:endParaRPr sz="1500" u="none" strike="noStrike" cap="none" dirty="0">
-                        <a:solidFill>
-                          <a:schemeClr val="dk1"/>
-                        </a:solidFill>
-                      </a:endParaRPr>
-                    </a:p>
-                  </a:txBody>
-                  <a:tcPr marL="91450" marR="91450" marT="45725" marB="45725">
-                    <a:lnL w="12700" cap="flat" cmpd="sng">
-                      <a:solidFill>
-                        <a:schemeClr val="dk1"/>
-                      </a:solidFill>
-                      <a:prstDash val="solid"/>
-                      <a:round/>
-                      <a:headEnd type="none" w="sm" len="sm"/>
-                      <a:tailEnd type="none" w="sm" len="sm"/>
-                    </a:lnL>
-                    <a:lnR w="12700" cap="flat" cmpd="sng">
-                      <a:solidFill>
-                        <a:schemeClr val="dk1"/>
-                      </a:solidFill>
-                      <a:prstDash val="solid"/>
-                      <a:round/>
-                      <a:headEnd type="none" w="sm" len="sm"/>
-                      <a:tailEnd type="none" w="sm" len="sm"/>
-                    </a:lnR>
-                    <a:lnT w="12700" cap="flat" cmpd="sng">
-                      <a:solidFill>
-                        <a:schemeClr val="dk1"/>
-                      </a:solidFill>
-                      <a:prstDash val="solid"/>
-                      <a:round/>
-                      <a:headEnd type="none" w="sm" len="sm"/>
-                      <a:tailEnd type="none" w="sm" len="sm"/>
-                    </a:lnT>
-                    <a:lnB w="12700" cap="flat" cmpd="sng" algn="ctr">
-                      <a:solidFill>
-                        <a:schemeClr val="dk1"/>
-                      </a:solidFill>
-                      <a:prstDash val="solid"/>
-                      <a:round/>
-                      <a:headEnd type="none" w="sm" len="sm"/>
-                      <a:tailEnd type="none" w="sm" len="sm"/>
-                    </a:lnB>
-                    <a:solidFill>
-                      <a:schemeClr val="lt1"/>
-                    </a:solidFill>
-                  </a:tcPr>
-                </a:tc>
-              </a:tr>
-              <a:tr h="562225">
-                <a:tc>
-                  <a:txBody>
-                    <a:bodyPr/>
-                    <a:lstStyle/>
-                    <a:p>
-                      <a:pPr marL="0" marR="0" lvl="0" indent="0" algn="ctr" rtl="0">
-                        <a:lnSpc>
-                          <a:spcPct val="100000"/>
-                        </a:lnSpc>
-                        <a:spcBef>
-                          <a:spcPts val="0"/>
-                        </a:spcBef>
-                        <a:spcAft>
-                          <a:spcPts val="0"/>
-                        </a:spcAft>
-                        <a:buClr>
-                          <a:srgbClr val="000000"/>
-                        </a:buClr>
-                        <a:buSzPts val="1500"/>
-                        <a:buFont typeface="Arial"/>
-                        <a:buNone/>
-                      </a:pPr>
-                      <a:r>
-                        <a:rPr lang="en-US" sz="1500" u="none" strike="noStrike" cap="none" dirty="0" smtClean="0">
-                          <a:solidFill>
-                            <a:schemeClr val="dk1"/>
-                          </a:solidFill>
-                        </a:rPr>
-                        <a:t>5</a:t>
-                      </a:r>
-                      <a:endParaRPr sz="1500" u="none" strike="noStrike" cap="none" dirty="0">
-                        <a:solidFill>
-                          <a:schemeClr val="dk1"/>
-                        </a:solidFill>
-                      </a:endParaRPr>
-                    </a:p>
-                  </a:txBody>
-                  <a:tcPr marL="91450" marR="91450" marT="45725" marB="45725" anchor="ctr">
-                    <a:lnL w="12700" cap="flat" cmpd="sng">
-                      <a:solidFill>
-                        <a:schemeClr val="dk1"/>
-                      </a:solidFill>
-                      <a:prstDash val="solid"/>
-                      <a:round/>
-                      <a:headEnd type="none" w="sm" len="sm"/>
-                      <a:tailEnd type="none" w="sm" len="sm"/>
-                    </a:lnL>
-                    <a:lnR w="12700" cap="flat" cmpd="sng">
-                      <a:solidFill>
-                        <a:schemeClr val="dk1"/>
-                      </a:solidFill>
-                      <a:prstDash val="solid"/>
-                      <a:round/>
-                      <a:headEnd type="none" w="sm" len="sm"/>
-                      <a:tailEnd type="none" w="sm" len="sm"/>
-                    </a:lnR>
-                    <a:lnT w="12700" cap="flat" cmpd="sng">
+                    <a:lnT w="12700" cap="flat" cmpd="sng" algn="ctr">
                       <a:solidFill>
                         <a:schemeClr val="dk1"/>
                       </a:solidFill>
@@ -30989,7 +30867,7 @@
                     </a:p>
                   </a:txBody>
                   <a:tcPr marL="91450" marR="91450" marT="45725" marB="45725">
-                    <a:lnL w="12700" cap="flat" cmpd="sng">
+                    <a:lnL w="12700" cap="flat" cmpd="sng" algn="ctr">
                       <a:solidFill>
                         <a:schemeClr val="dk1"/>
                       </a:solidFill>
@@ -31007,7 +30885,7 @@
                       <a:headEnd type="none" w="sm" len="sm"/>
                       <a:tailEnd type="none" w="sm" len="sm"/>
                     </a:lnR>
-                    <a:lnT w="12700" cap="flat" cmpd="sng">
+                    <a:lnT w="12700" cap="flat" cmpd="sng" algn="ctr">
                       <a:solidFill>
                         <a:schemeClr val="dk1"/>
                       </a:solidFill>
@@ -31274,7 +31152,7 @@
               <a:buNone/>
             </a:pPr>
             <a:r>
-              <a:rPr lang="ko-KR" sz="1800" b="1" i="0" u="none" strike="noStrike" cap="none" dirty="0">
+              <a:rPr lang="en-US" b="1" dirty="0">
                 <a:solidFill>
                   <a:schemeClr val="dk1"/>
                 </a:solidFill>
@@ -31283,7 +31161,7 @@
                 <a:cs typeface="Malgun Gothic"/>
                 <a:sym typeface="Malgun Gothic"/>
               </a:rPr>
-              <a:t>4</a:t>
+              <a:t>1</a:t>
             </a:r>
             <a:endParaRPr sz="1800" b="1" i="0" u="none" strike="noStrike" cap="none" dirty="0">
               <a:solidFill>
@@ -41507,7 +41385,7 @@
   <a:extraClrSchemeLst/>
   <a:extLst>
     <a:ext uri="{05A4C25C-085E-4340-85A3-A5531E510DB2}">
-      <thm15:themeFamily xmlns:thm15="http://schemas.microsoft.com/office/thememl/2012/main" name="Office Theme" id="{62F939B6-93AF-4DB8-9C6B-D6C7DFDC589F}" vid="{4A3C46E8-61CC-4603-A589-7422A47A8E4A}"/>
+      <thm15:themeFamily xmlns:thm15="http://schemas.microsoft.com/office/thememl/2012/main" xmlns="" name="Office Theme" id="{62F939B6-93AF-4DB8-9C6B-D6C7DFDC589F}" vid="{4A3C46E8-61CC-4603-A589-7422A47A8E4A}"/>
     </a:ext>
   </a:extLst>
 </a:theme>
@@ -41768,7 +41646,7 @@
   <a:extraClrSchemeLst/>
   <a:extLst>
     <a:ext uri="{05A4C25C-085E-4340-85A3-A5531E510DB2}">
-      <thm15:themeFamily xmlns:thm15="http://schemas.microsoft.com/office/thememl/2012/main" name="Office Theme" id="{62F939B6-93AF-4DB8-9C6B-D6C7DFDC589F}" vid="{4A3C46E8-61CC-4603-A589-7422A47A8E4A}"/>
+      <thm15:themeFamily xmlns:thm15="http://schemas.microsoft.com/office/thememl/2012/main" xmlns="" name="Office Theme" id="{62F939B6-93AF-4DB8-9C6B-D6C7DFDC589F}" vid="{4A3C46E8-61CC-4603-A589-7422A47A8E4A}"/>
     </a:ext>
   </a:extLst>
 </a:theme>

</xml_diff>